<commit_message>
Update Python course part 3
</commit_message>
<xml_diff>
--- a/python_course/3_pandas_plotting/python_cursus_3.pptx
+++ b/python_course/3_pandas_plotting/python_cursus_3.pptx
@@ -242,7 +242,7 @@
           <a:p>
             <a:fld id="{16CF57F2-0494-4F4F-A7AD-E8F59CFB368A}" type="datetimeFigureOut">
               <a:rPr lang="en-NL" smtClean="0"/>
-              <a:t>16/09/2024</a:t>
+              <a:t>09/10/2024</a:t>
             </a:fld>
             <a:endParaRPr lang="en-NL"/>
           </a:p>
@@ -1288,7 +1288,7 @@
           <a:p>
             <a:fld id="{0EBB069A-003F-4FC0-8534-236B0C5C7B5F}" type="datetimeFigureOut">
               <a:rPr lang="en-NL" smtClean="0"/>
-              <a:t>16/09/2024</a:t>
+              <a:t>09/10/2024</a:t>
             </a:fld>
             <a:endParaRPr lang="en-NL"/>
           </a:p>
@@ -1488,7 +1488,7 @@
           <a:p>
             <a:fld id="{0EBB069A-003F-4FC0-8534-236B0C5C7B5F}" type="datetimeFigureOut">
               <a:rPr lang="en-NL" smtClean="0"/>
-              <a:t>16/09/2024</a:t>
+              <a:t>09/10/2024</a:t>
             </a:fld>
             <a:endParaRPr lang="en-NL"/>
           </a:p>
@@ -1698,7 +1698,7 @@
           <a:p>
             <a:fld id="{0EBB069A-003F-4FC0-8534-236B0C5C7B5F}" type="datetimeFigureOut">
               <a:rPr lang="en-NL" smtClean="0"/>
-              <a:t>16/09/2024</a:t>
+              <a:t>09/10/2024</a:t>
             </a:fld>
             <a:endParaRPr lang="en-NL"/>
           </a:p>
@@ -1898,7 +1898,7 @@
           <a:p>
             <a:fld id="{0EBB069A-003F-4FC0-8534-236B0C5C7B5F}" type="datetimeFigureOut">
               <a:rPr lang="en-NL" smtClean="0"/>
-              <a:t>16/09/2024</a:t>
+              <a:t>09/10/2024</a:t>
             </a:fld>
             <a:endParaRPr lang="en-NL"/>
           </a:p>
@@ -2174,7 +2174,7 @@
           <a:p>
             <a:fld id="{0EBB069A-003F-4FC0-8534-236B0C5C7B5F}" type="datetimeFigureOut">
               <a:rPr lang="en-NL" smtClean="0"/>
-              <a:t>16/09/2024</a:t>
+              <a:t>09/10/2024</a:t>
             </a:fld>
             <a:endParaRPr lang="en-NL"/>
           </a:p>
@@ -2442,7 +2442,7 @@
           <a:p>
             <a:fld id="{0EBB069A-003F-4FC0-8534-236B0C5C7B5F}" type="datetimeFigureOut">
               <a:rPr lang="en-NL" smtClean="0"/>
-              <a:t>16/09/2024</a:t>
+              <a:t>09/10/2024</a:t>
             </a:fld>
             <a:endParaRPr lang="en-NL"/>
           </a:p>
@@ -2857,7 +2857,7 @@
           <a:p>
             <a:fld id="{0EBB069A-003F-4FC0-8534-236B0C5C7B5F}" type="datetimeFigureOut">
               <a:rPr lang="en-NL" smtClean="0"/>
-              <a:t>16/09/2024</a:t>
+              <a:t>09/10/2024</a:t>
             </a:fld>
             <a:endParaRPr lang="en-NL"/>
           </a:p>
@@ -2999,7 +2999,7 @@
           <a:p>
             <a:fld id="{0EBB069A-003F-4FC0-8534-236B0C5C7B5F}" type="datetimeFigureOut">
               <a:rPr lang="en-NL" smtClean="0"/>
-              <a:t>16/09/2024</a:t>
+              <a:t>09/10/2024</a:t>
             </a:fld>
             <a:endParaRPr lang="en-NL"/>
           </a:p>
@@ -3112,7 +3112,7 @@
           <a:p>
             <a:fld id="{0EBB069A-003F-4FC0-8534-236B0C5C7B5F}" type="datetimeFigureOut">
               <a:rPr lang="en-NL" smtClean="0"/>
-              <a:t>16/09/2024</a:t>
+              <a:t>09/10/2024</a:t>
             </a:fld>
             <a:endParaRPr lang="en-NL"/>
           </a:p>
@@ -3425,7 +3425,7 @@
           <a:p>
             <a:fld id="{0EBB069A-003F-4FC0-8534-236B0C5C7B5F}" type="datetimeFigureOut">
               <a:rPr lang="en-NL" smtClean="0"/>
-              <a:t>16/09/2024</a:t>
+              <a:t>09/10/2024</a:t>
             </a:fld>
             <a:endParaRPr lang="en-NL"/>
           </a:p>
@@ -3714,7 +3714,7 @@
           <a:p>
             <a:fld id="{0EBB069A-003F-4FC0-8534-236B0C5C7B5F}" type="datetimeFigureOut">
               <a:rPr lang="en-NL" smtClean="0"/>
-              <a:t>16/09/2024</a:t>
+              <a:t>09/10/2024</a:t>
             </a:fld>
             <a:endParaRPr lang="en-NL"/>
           </a:p>
@@ -3957,7 +3957,7 @@
           <a:p>
             <a:fld id="{0EBB069A-003F-4FC0-8534-236B0C5C7B5F}" type="datetimeFigureOut">
               <a:rPr lang="en-NL" smtClean="0"/>
-              <a:t>16/09/2024</a:t>
+              <a:t>09/10/2024</a:t>
             </a:fld>
             <a:endParaRPr lang="en-NL"/>
           </a:p>
@@ -6670,7 +6670,7 @@
           <p:nvPr>
             <p:extLst>
               <p:ext uri="{D42A27DB-BD31-4B8C-83A1-F6EECF244321}">
-                <p14:modId xmlns:p14="http://schemas.microsoft.com/office/powerpoint/2010/main" val="823900636"/>
+                <p14:modId xmlns:p14="http://schemas.microsoft.com/office/powerpoint/2010/main" val="3880330535"/>
               </p:ext>
             </p:extLst>
           </p:nvPr>
@@ -6795,6 +6795,20 @@
                       </a:r>
                     </a:p>
                     <a:p>
+                      <a:r>
+                        <a:rPr lang="en-US" sz="1600" b="1" dirty="0" err="1">
+                          <a:latin typeface="Courier New" panose="02070309020205020404" pitchFamily="49" charset="0"/>
+                          <a:cs typeface="Courier New" panose="02070309020205020404" pitchFamily="49" charset="0"/>
+                        </a:rPr>
+                        <a:t>df</a:t>
+                      </a:r>
+                      <a:r>
+                        <a:rPr lang="en-US" sz="1600" b="1" dirty="0">
+                          <a:latin typeface="Courier New" panose="02070309020205020404" pitchFamily="49" charset="0"/>
+                          <a:cs typeface="Courier New" panose="02070309020205020404" pitchFamily="49" charset="0"/>
+                        </a:rPr>
+                        <a:t> = </a:t>
+                      </a:r>
                       <a:r>
                         <a:rPr lang="en-US" sz="1600" b="1" dirty="0" err="1">
                           <a:latin typeface="Courier New" panose="02070309020205020404" pitchFamily="49" charset="0"/>

</xml_diff>

<commit_message>
Update Python part 4, create git
</commit_message>
<xml_diff>
--- a/python_course/3_pandas_plotting/python_cursus_3.pptx
+++ b/python_course/3_pandas_plotting/python_cursus_3.pptx
@@ -242,7 +242,7 @@
           <a:p>
             <a:fld id="{16CF57F2-0494-4F4F-A7AD-E8F59CFB368A}" type="datetimeFigureOut">
               <a:rPr lang="en-NL" smtClean="0"/>
-              <a:t>09/10/2024</a:t>
+              <a:t>11/10/2024</a:t>
             </a:fld>
             <a:endParaRPr lang="en-NL"/>
           </a:p>
@@ -1288,7 +1288,7 @@
           <a:p>
             <a:fld id="{0EBB069A-003F-4FC0-8534-236B0C5C7B5F}" type="datetimeFigureOut">
               <a:rPr lang="en-NL" smtClean="0"/>
-              <a:t>09/10/2024</a:t>
+              <a:t>11/10/2024</a:t>
             </a:fld>
             <a:endParaRPr lang="en-NL"/>
           </a:p>
@@ -1488,7 +1488,7 @@
           <a:p>
             <a:fld id="{0EBB069A-003F-4FC0-8534-236B0C5C7B5F}" type="datetimeFigureOut">
               <a:rPr lang="en-NL" smtClean="0"/>
-              <a:t>09/10/2024</a:t>
+              <a:t>11/10/2024</a:t>
             </a:fld>
             <a:endParaRPr lang="en-NL"/>
           </a:p>
@@ -1698,7 +1698,7 @@
           <a:p>
             <a:fld id="{0EBB069A-003F-4FC0-8534-236B0C5C7B5F}" type="datetimeFigureOut">
               <a:rPr lang="en-NL" smtClean="0"/>
-              <a:t>09/10/2024</a:t>
+              <a:t>11/10/2024</a:t>
             </a:fld>
             <a:endParaRPr lang="en-NL"/>
           </a:p>
@@ -1898,7 +1898,7 @@
           <a:p>
             <a:fld id="{0EBB069A-003F-4FC0-8534-236B0C5C7B5F}" type="datetimeFigureOut">
               <a:rPr lang="en-NL" smtClean="0"/>
-              <a:t>09/10/2024</a:t>
+              <a:t>11/10/2024</a:t>
             </a:fld>
             <a:endParaRPr lang="en-NL"/>
           </a:p>
@@ -2174,7 +2174,7 @@
           <a:p>
             <a:fld id="{0EBB069A-003F-4FC0-8534-236B0C5C7B5F}" type="datetimeFigureOut">
               <a:rPr lang="en-NL" smtClean="0"/>
-              <a:t>09/10/2024</a:t>
+              <a:t>11/10/2024</a:t>
             </a:fld>
             <a:endParaRPr lang="en-NL"/>
           </a:p>
@@ -2442,7 +2442,7 @@
           <a:p>
             <a:fld id="{0EBB069A-003F-4FC0-8534-236B0C5C7B5F}" type="datetimeFigureOut">
               <a:rPr lang="en-NL" smtClean="0"/>
-              <a:t>09/10/2024</a:t>
+              <a:t>11/10/2024</a:t>
             </a:fld>
             <a:endParaRPr lang="en-NL"/>
           </a:p>
@@ -2857,7 +2857,7 @@
           <a:p>
             <a:fld id="{0EBB069A-003F-4FC0-8534-236B0C5C7B5F}" type="datetimeFigureOut">
               <a:rPr lang="en-NL" smtClean="0"/>
-              <a:t>09/10/2024</a:t>
+              <a:t>11/10/2024</a:t>
             </a:fld>
             <a:endParaRPr lang="en-NL"/>
           </a:p>
@@ -2999,7 +2999,7 @@
           <a:p>
             <a:fld id="{0EBB069A-003F-4FC0-8534-236B0C5C7B5F}" type="datetimeFigureOut">
               <a:rPr lang="en-NL" smtClean="0"/>
-              <a:t>09/10/2024</a:t>
+              <a:t>11/10/2024</a:t>
             </a:fld>
             <a:endParaRPr lang="en-NL"/>
           </a:p>
@@ -3112,7 +3112,7 @@
           <a:p>
             <a:fld id="{0EBB069A-003F-4FC0-8534-236B0C5C7B5F}" type="datetimeFigureOut">
               <a:rPr lang="en-NL" smtClean="0"/>
-              <a:t>09/10/2024</a:t>
+              <a:t>11/10/2024</a:t>
             </a:fld>
             <a:endParaRPr lang="en-NL"/>
           </a:p>
@@ -3425,7 +3425,7 @@
           <a:p>
             <a:fld id="{0EBB069A-003F-4FC0-8534-236B0C5C7B5F}" type="datetimeFigureOut">
               <a:rPr lang="en-NL" smtClean="0"/>
-              <a:t>09/10/2024</a:t>
+              <a:t>11/10/2024</a:t>
             </a:fld>
             <a:endParaRPr lang="en-NL"/>
           </a:p>
@@ -3714,7 +3714,7 @@
           <a:p>
             <a:fld id="{0EBB069A-003F-4FC0-8534-236B0C5C7B5F}" type="datetimeFigureOut">
               <a:rPr lang="en-NL" smtClean="0"/>
-              <a:t>09/10/2024</a:t>
+              <a:t>11/10/2024</a:t>
             </a:fld>
             <a:endParaRPr lang="en-NL"/>
           </a:p>
@@ -3957,7 +3957,7 @@
           <a:p>
             <a:fld id="{0EBB069A-003F-4FC0-8534-236B0C5C7B5F}" type="datetimeFigureOut">
               <a:rPr lang="en-NL" smtClean="0"/>
-              <a:t>09/10/2024</a:t>
+              <a:t>11/10/2024</a:t>
             </a:fld>
             <a:endParaRPr lang="en-NL"/>
           </a:p>
@@ -26405,7 +26405,7 @@
               <a:t>other</a:t>
             </a:r>
             <a:r>
-              <a:rPr lang="nl-NL" sz="1400" dirty="0">
+              <a:rPr lang="nl-NL" sz="1400">
                 <a:solidFill>
                   <a:schemeClr val="accent2">
                     <a:lumMod val="75000"/>
@@ -26417,12 +26417,16 @@
               <a:t>"</a:t>
             </a:r>
             <a:r>
-              <a:rPr lang="nl-NL" sz="1400" dirty="0">
-                <a:latin typeface="Courier New" panose="02070309020205020404" pitchFamily="49" charset="0"/>
-                <a:cs typeface="Courier New" panose="02070309020205020404" pitchFamily="49" charset="0"/>
-              </a:rPr>
-              <a:t>]</a:t>
-            </a:r>
+              <a:rPr lang="nl-NL" sz="1400">
+                <a:latin typeface="Courier New" panose="02070309020205020404" pitchFamily="49" charset="0"/>
+                <a:cs typeface="Courier New" panose="02070309020205020404" pitchFamily="49" charset="0"/>
+              </a:rPr>
+              <a:t>])</a:t>
+            </a:r>
+            <a:endParaRPr lang="nl-NL" sz="1400" dirty="0">
+              <a:latin typeface="Courier New" panose="02070309020205020404" pitchFamily="49" charset="0"/>
+              <a:cs typeface="Courier New" panose="02070309020205020404" pitchFamily="49" charset="0"/>
+            </a:endParaRPr>
           </a:p>
           <a:p>
             <a:pPr marL="0" indent="0">

</xml_diff>

<commit_message>
Finalize Python part 4
</commit_message>
<xml_diff>
--- a/python_course/3_pandas_plotting/python_cursus_3.pptx
+++ b/python_course/3_pandas_plotting/python_cursus_3.pptx
@@ -242,7 +242,7 @@
           <a:p>
             <a:fld id="{16CF57F2-0494-4F4F-A7AD-E8F59CFB368A}" type="datetimeFigureOut">
               <a:rPr lang="en-NL" smtClean="0"/>
-              <a:t>11/10/2024</a:t>
+              <a:t>16/10/2024</a:t>
             </a:fld>
             <a:endParaRPr lang="en-NL"/>
           </a:p>
@@ -1288,7 +1288,7 @@
           <a:p>
             <a:fld id="{0EBB069A-003F-4FC0-8534-236B0C5C7B5F}" type="datetimeFigureOut">
               <a:rPr lang="en-NL" smtClean="0"/>
-              <a:t>11/10/2024</a:t>
+              <a:t>16/10/2024</a:t>
             </a:fld>
             <a:endParaRPr lang="en-NL"/>
           </a:p>
@@ -1488,7 +1488,7 @@
           <a:p>
             <a:fld id="{0EBB069A-003F-4FC0-8534-236B0C5C7B5F}" type="datetimeFigureOut">
               <a:rPr lang="en-NL" smtClean="0"/>
-              <a:t>11/10/2024</a:t>
+              <a:t>16/10/2024</a:t>
             </a:fld>
             <a:endParaRPr lang="en-NL"/>
           </a:p>
@@ -1698,7 +1698,7 @@
           <a:p>
             <a:fld id="{0EBB069A-003F-4FC0-8534-236B0C5C7B5F}" type="datetimeFigureOut">
               <a:rPr lang="en-NL" smtClean="0"/>
-              <a:t>11/10/2024</a:t>
+              <a:t>16/10/2024</a:t>
             </a:fld>
             <a:endParaRPr lang="en-NL"/>
           </a:p>
@@ -1898,7 +1898,7 @@
           <a:p>
             <a:fld id="{0EBB069A-003F-4FC0-8534-236B0C5C7B5F}" type="datetimeFigureOut">
               <a:rPr lang="en-NL" smtClean="0"/>
-              <a:t>11/10/2024</a:t>
+              <a:t>16/10/2024</a:t>
             </a:fld>
             <a:endParaRPr lang="en-NL"/>
           </a:p>
@@ -2174,7 +2174,7 @@
           <a:p>
             <a:fld id="{0EBB069A-003F-4FC0-8534-236B0C5C7B5F}" type="datetimeFigureOut">
               <a:rPr lang="en-NL" smtClean="0"/>
-              <a:t>11/10/2024</a:t>
+              <a:t>16/10/2024</a:t>
             </a:fld>
             <a:endParaRPr lang="en-NL"/>
           </a:p>
@@ -2442,7 +2442,7 @@
           <a:p>
             <a:fld id="{0EBB069A-003F-4FC0-8534-236B0C5C7B5F}" type="datetimeFigureOut">
               <a:rPr lang="en-NL" smtClean="0"/>
-              <a:t>11/10/2024</a:t>
+              <a:t>16/10/2024</a:t>
             </a:fld>
             <a:endParaRPr lang="en-NL"/>
           </a:p>
@@ -2857,7 +2857,7 @@
           <a:p>
             <a:fld id="{0EBB069A-003F-4FC0-8534-236B0C5C7B5F}" type="datetimeFigureOut">
               <a:rPr lang="en-NL" smtClean="0"/>
-              <a:t>11/10/2024</a:t>
+              <a:t>16/10/2024</a:t>
             </a:fld>
             <a:endParaRPr lang="en-NL"/>
           </a:p>
@@ -2999,7 +2999,7 @@
           <a:p>
             <a:fld id="{0EBB069A-003F-4FC0-8534-236B0C5C7B5F}" type="datetimeFigureOut">
               <a:rPr lang="en-NL" smtClean="0"/>
-              <a:t>11/10/2024</a:t>
+              <a:t>16/10/2024</a:t>
             </a:fld>
             <a:endParaRPr lang="en-NL"/>
           </a:p>
@@ -3112,7 +3112,7 @@
           <a:p>
             <a:fld id="{0EBB069A-003F-4FC0-8534-236B0C5C7B5F}" type="datetimeFigureOut">
               <a:rPr lang="en-NL" smtClean="0"/>
-              <a:t>11/10/2024</a:t>
+              <a:t>16/10/2024</a:t>
             </a:fld>
             <a:endParaRPr lang="en-NL"/>
           </a:p>
@@ -3425,7 +3425,7 @@
           <a:p>
             <a:fld id="{0EBB069A-003F-4FC0-8534-236B0C5C7B5F}" type="datetimeFigureOut">
               <a:rPr lang="en-NL" smtClean="0"/>
-              <a:t>11/10/2024</a:t>
+              <a:t>16/10/2024</a:t>
             </a:fld>
             <a:endParaRPr lang="en-NL"/>
           </a:p>
@@ -3714,7 +3714,7 @@
           <a:p>
             <a:fld id="{0EBB069A-003F-4FC0-8534-236B0C5C7B5F}" type="datetimeFigureOut">
               <a:rPr lang="en-NL" smtClean="0"/>
-              <a:t>11/10/2024</a:t>
+              <a:t>16/10/2024</a:t>
             </a:fld>
             <a:endParaRPr lang="en-NL"/>
           </a:p>
@@ -3957,7 +3957,7 @@
           <a:p>
             <a:fld id="{0EBB069A-003F-4FC0-8534-236B0C5C7B5F}" type="datetimeFigureOut">
               <a:rPr lang="en-NL" smtClean="0"/>
-              <a:t>11/10/2024</a:t>
+              <a:t>16/10/2024</a:t>
             </a:fld>
             <a:endParaRPr lang="en-NL"/>
           </a:p>
@@ -22935,6 +22935,12 @@
           <a:prstGeom prst="rect">
             <a:avLst/>
           </a:prstGeom>
+          <a:solidFill>
+            <a:schemeClr val="accent4">
+              <a:lumMod val="40000"/>
+              <a:lumOff val="60000"/>
+            </a:schemeClr>
+          </a:solidFill>
         </p:spPr>
         <p:style>
           <a:lnRef idx="1">
@@ -23010,6 +23016,12 @@
             <a:prstGeom prst="rect">
               <a:avLst/>
             </a:prstGeom>
+            <a:solidFill>
+              <a:schemeClr val="accent6">
+                <a:lumMod val="40000"/>
+                <a:lumOff val="60000"/>
+              </a:schemeClr>
+            </a:solidFill>
           </p:spPr>
           <p:style>
             <a:lnRef idx="1">
@@ -23064,6 +23076,12 @@
             <a:prstGeom prst="rect">
               <a:avLst/>
             </a:prstGeom>
+            <a:solidFill>
+              <a:schemeClr val="accent5">
+                <a:lumMod val="40000"/>
+                <a:lumOff val="60000"/>
+              </a:schemeClr>
+            </a:solidFill>
           </p:spPr>
           <p:style>
             <a:lnRef idx="1">
@@ -24019,7 +24037,7 @@
             <p:ph idx="1"/>
             <p:extLst>
               <p:ext uri="{D42A27DB-BD31-4B8C-83A1-F6EECF244321}">
-                <p14:modId xmlns:p14="http://schemas.microsoft.com/office/powerpoint/2010/main" val="365110954"/>
+                <p14:modId xmlns:p14="http://schemas.microsoft.com/office/powerpoint/2010/main" val="3168060973"/>
               </p:ext>
             </p:extLst>
           </p:nvPr>
@@ -24149,8 +24167,8 @@
                     </a:lnL>
                     <a:solidFill>
                       <a:schemeClr val="accent4">
-                        <a:lumMod val="60000"/>
-                        <a:lumOff val="40000"/>
+                        <a:lumMod val="40000"/>
+                        <a:lumOff val="60000"/>
                       </a:schemeClr>
                     </a:solidFill>
                   </a:tcPr>
@@ -24184,8 +24202,8 @@
                     </a:lnB>
                     <a:solidFill>
                       <a:schemeClr val="accent4">
-                        <a:lumMod val="60000"/>
-                        <a:lumOff val="40000"/>
+                        <a:lumMod val="40000"/>
+                        <a:lumOff val="60000"/>
                       </a:schemeClr>
                     </a:solidFill>
                   </a:tcPr>
@@ -24209,8 +24227,8 @@
                     </a:lnT>
                     <a:solidFill>
                       <a:schemeClr val="accent4">
-                        <a:lumMod val="40000"/>
-                        <a:lumOff val="60000"/>
+                        <a:lumMod val="20000"/>
+                        <a:lumOff val="80000"/>
                       </a:schemeClr>
                     </a:solidFill>
                   </a:tcPr>
@@ -24256,76 +24274,6 @@
                       <a:r>
                         <a:rPr lang="en-US" dirty="0"/>
                         <a:t>1</a:t>
-                      </a:r>
-                      <a:endParaRPr lang="en-NL" dirty="0"/>
-                    </a:p>
-                  </a:txBody>
-                  <a:tcPr anchor="ctr">
-                    <a:solidFill>
-                      <a:schemeClr val="accent4">
-                        <a:lumMod val="60000"/>
-                        <a:lumOff val="40000"/>
-                      </a:schemeClr>
-                    </a:solidFill>
-                  </a:tcPr>
-                </a:tc>
-                <a:tc>
-                  <a:txBody>
-                    <a:bodyPr/>
-                    <a:lstStyle/>
-                    <a:p>
-                      <a:pPr marL="0" marR="0" lvl="0" indent="0" algn="ctr" defTabSz="914400" rtl="0" eaLnBrk="1" fontAlgn="auto" latinLnBrk="0" hangingPunct="1">
-                        <a:lnSpc>
-                          <a:spcPct val="100000"/>
-                        </a:lnSpc>
-                        <a:spcBef>
-                          <a:spcPts val="0"/>
-                        </a:spcBef>
-                        <a:spcAft>
-                          <a:spcPts val="0"/>
-                        </a:spcAft>
-                        <a:buClrTx/>
-                        <a:buSzTx/>
-                        <a:buFontTx/>
-                        <a:buNone/>
-                        <a:tabLst/>
-                        <a:defRPr/>
-                      </a:pPr>
-                      <a:r>
-                        <a:rPr lang="en-US" dirty="0"/>
-                        <a:t>9.0</a:t>
-                      </a:r>
-                      <a:endParaRPr lang="en-NL" dirty="0"/>
-                    </a:p>
-                  </a:txBody>
-                  <a:tcPr anchor="ctr"/>
-                </a:tc>
-                <a:extLst>
-                  <a:ext uri="{0D108BD9-81ED-4DB2-BD59-A6C34878D82A}">
-                    <a16:rowId xmlns:a16="http://schemas.microsoft.com/office/drawing/2014/main" val="3432716353"/>
-                  </a:ext>
-                </a:extLst>
-              </a:tr>
-              <a:tr h="609071">
-                <a:tc vMerge="1">
-                  <a:txBody>
-                    <a:bodyPr/>
-                    <a:lstStyle/>
-                    <a:p>
-                      <a:endParaRPr lang="en-NL" dirty="0"/>
-                    </a:p>
-                  </a:txBody>
-                  <a:tcPr/>
-                </a:tc>
-                <a:tc>
-                  <a:txBody>
-                    <a:bodyPr/>
-                    <a:lstStyle/>
-                    <a:p>
-                      <a:pPr algn="ctr"/>
-                      <a:r>
-                        <a:rPr lang="en-US" dirty="0"/>
-                        <a:t>2</a:t>
                       </a:r>
                       <a:endParaRPr lang="en-NL" dirty="0"/>
                     </a:p>
@@ -24363,6 +24311,76 @@
                       </a:pPr>
                       <a:r>
                         <a:rPr lang="en-US" dirty="0"/>
+                        <a:t>9.0</a:t>
+                      </a:r>
+                      <a:endParaRPr lang="en-NL" dirty="0"/>
+                    </a:p>
+                  </a:txBody>
+                  <a:tcPr anchor="ctr"/>
+                </a:tc>
+                <a:extLst>
+                  <a:ext uri="{0D108BD9-81ED-4DB2-BD59-A6C34878D82A}">
+                    <a16:rowId xmlns:a16="http://schemas.microsoft.com/office/drawing/2014/main" val="3432716353"/>
+                  </a:ext>
+                </a:extLst>
+              </a:tr>
+              <a:tr h="609071">
+                <a:tc vMerge="1">
+                  <a:txBody>
+                    <a:bodyPr/>
+                    <a:lstStyle/>
+                    <a:p>
+                      <a:endParaRPr lang="en-NL" dirty="0"/>
+                    </a:p>
+                  </a:txBody>
+                  <a:tcPr/>
+                </a:tc>
+                <a:tc>
+                  <a:txBody>
+                    <a:bodyPr/>
+                    <a:lstStyle/>
+                    <a:p>
+                      <a:pPr algn="ctr"/>
+                      <a:r>
+                        <a:rPr lang="en-US" dirty="0"/>
+                        <a:t>2</a:t>
+                      </a:r>
+                      <a:endParaRPr lang="en-NL" dirty="0"/>
+                    </a:p>
+                  </a:txBody>
+                  <a:tcPr anchor="ctr">
+                    <a:solidFill>
+                      <a:schemeClr val="accent4">
+                        <a:lumMod val="20000"/>
+                        <a:lumOff val="80000"/>
+                      </a:schemeClr>
+                    </a:solidFill>
+                  </a:tcPr>
+                </a:tc>
+                <a:tc>
+                  <a:txBody>
+                    <a:bodyPr/>
+                    <a:lstStyle/>
+                    <a:p>
+                      <a:pPr marL="0" marR="0" lvl="0" indent="0" algn="ctr" defTabSz="914400" rtl="0" eaLnBrk="1" fontAlgn="auto" latinLnBrk="0" hangingPunct="1">
+                        <a:lnSpc>
+                          <a:spcPct val="100000"/>
+                        </a:lnSpc>
+                        <a:spcBef>
+                          <a:spcPts val="0"/>
+                        </a:spcBef>
+                        <a:spcAft>
+                          <a:spcPts val="0"/>
+                        </a:spcAft>
+                        <a:buClrTx/>
+                        <a:buSzTx/>
+                        <a:buFontTx/>
+                        <a:buNone/>
+                        <a:tabLst/>
+                        <a:defRPr/>
+                      </a:pPr>
+                      <a:r>
+                        <a:rPr lang="en-US" dirty="0"/>
                         <a:t>7.5</a:t>
                       </a:r>
                       <a:endParaRPr lang="en-NL" dirty="0"/>
@@ -24403,8 +24421,8 @@
                   <a:tcPr anchor="ctr">
                     <a:solidFill>
                       <a:schemeClr val="accent4">
-                        <a:lumMod val="60000"/>
-                        <a:lumOff val="40000"/>
+                        <a:lumMod val="40000"/>
+                        <a:lumOff val="60000"/>
                       </a:schemeClr>
                     </a:solidFill>
                   </a:tcPr>
@@ -24476,8 +24494,8 @@
                     </a:lnB>
                     <a:solidFill>
                       <a:schemeClr val="accent4">
-                        <a:lumMod val="40000"/>
-                        <a:lumOff val="60000"/>
+                        <a:lumMod val="20000"/>
+                        <a:lumOff val="80000"/>
                       </a:schemeClr>
                     </a:solidFill>
                   </a:tcPr>
@@ -24611,8 +24629,8 @@
                     </a:lnL>
                     <a:solidFill>
                       <a:schemeClr val="accent4">
-                        <a:lumMod val="60000"/>
-                        <a:lumOff val="40000"/>
+                        <a:lumMod val="40000"/>
+                        <a:lumOff val="60000"/>
                       </a:schemeClr>
                     </a:solidFill>
                   </a:tcPr>
@@ -26538,7 +26556,7 @@
             <p:ph idx="1"/>
             <p:extLst>
               <p:ext uri="{D42A27DB-BD31-4B8C-83A1-F6EECF244321}">
-                <p14:modId xmlns:p14="http://schemas.microsoft.com/office/powerpoint/2010/main" val="1091286475"/>
+                <p14:modId xmlns:p14="http://schemas.microsoft.com/office/powerpoint/2010/main" val="3011201870"/>
               </p:ext>
             </p:extLst>
           </p:nvPr>
@@ -26685,8 +26703,8 @@
                     </a:lnR>
                     <a:solidFill>
                       <a:schemeClr val="accent4">
-                        <a:lumMod val="60000"/>
-                        <a:lumOff val="40000"/>
+                        <a:lumMod val="40000"/>
+                        <a:lumOff val="60000"/>
                       </a:schemeClr>
                     </a:solidFill>
                   </a:tcPr>
@@ -26720,8 +26738,8 @@
                     </a:lnR>
                     <a:solidFill>
                       <a:schemeClr val="accent4">
-                        <a:lumMod val="60000"/>
-                        <a:lumOff val="40000"/>
+                        <a:lumMod val="40000"/>
+                        <a:lumOff val="60000"/>
                       </a:schemeClr>
                     </a:solidFill>
                   </a:tcPr>
@@ -26752,8 +26770,8 @@
                     </a:lnL>
                     <a:solidFill>
                       <a:schemeClr val="accent4">
-                        <a:lumMod val="60000"/>
-                        <a:lumOff val="40000"/>
+                        <a:lumMod val="40000"/>
+                        <a:lumOff val="60000"/>
                       </a:schemeClr>
                     </a:solidFill>
                   </a:tcPr>
@@ -26787,8 +26805,8 @@
                     </a:lnB>
                     <a:solidFill>
                       <a:schemeClr val="accent4">
-                        <a:lumMod val="60000"/>
-                        <a:lumOff val="40000"/>
+                        <a:lumMod val="40000"/>
+                        <a:lumOff val="60000"/>
                       </a:schemeClr>
                     </a:solidFill>
                   </a:tcPr>
@@ -26812,8 +26830,8 @@
                     </a:lnT>
                     <a:solidFill>
                       <a:schemeClr val="accent4">
-                        <a:lumMod val="40000"/>
-                        <a:lumOff val="60000"/>
+                        <a:lumMod val="20000"/>
+                        <a:lumOff val="80000"/>
                       </a:schemeClr>
                     </a:solidFill>
                   </a:tcPr>
@@ -26889,138 +26907,6 @@
                       <a:r>
                         <a:rPr lang="en-US" dirty="0"/>
                         <a:t>1</a:t>
-                      </a:r>
-                      <a:endParaRPr lang="en-NL" dirty="0"/>
-                    </a:p>
-                  </a:txBody>
-                  <a:tcPr anchor="ctr">
-                    <a:solidFill>
-                      <a:schemeClr val="accent4">
-                        <a:lumMod val="60000"/>
-                        <a:lumOff val="40000"/>
-                      </a:schemeClr>
-                    </a:solidFill>
-                  </a:tcPr>
-                </a:tc>
-                <a:tc>
-                  <a:txBody>
-                    <a:bodyPr/>
-                    <a:lstStyle/>
-                    <a:p>
-                      <a:pPr marL="0" marR="0" lvl="0" indent="0" algn="ctr" defTabSz="914400" rtl="0" eaLnBrk="1" fontAlgn="auto" latinLnBrk="0" hangingPunct="1">
-                        <a:lnSpc>
-                          <a:spcPct val="100000"/>
-                        </a:lnSpc>
-                        <a:spcBef>
-                          <a:spcPts val="0"/>
-                        </a:spcBef>
-                        <a:spcAft>
-                          <a:spcPts val="0"/>
-                        </a:spcAft>
-                        <a:buClrTx/>
-                        <a:buSzTx/>
-                        <a:buFontTx/>
-                        <a:buNone/>
-                        <a:tabLst/>
-                        <a:defRPr/>
-                      </a:pPr>
-                      <a:r>
-                        <a:rPr lang="en-US" dirty="0"/>
-                        <a:t>Ingrid</a:t>
-                      </a:r>
-                      <a:endParaRPr lang="en-NL" dirty="0"/>
-                    </a:p>
-                  </a:txBody>
-                  <a:tcPr anchor="ctr"/>
-                </a:tc>
-                <a:tc>
-                  <a:txBody>
-                    <a:bodyPr/>
-                    <a:lstStyle/>
-                    <a:p>
-                      <a:pPr marL="0" marR="0" lvl="0" indent="0" algn="ctr" defTabSz="914400" rtl="0" eaLnBrk="1" fontAlgn="auto" latinLnBrk="0" hangingPunct="1">
-                        <a:lnSpc>
-                          <a:spcPct val="100000"/>
-                        </a:lnSpc>
-                        <a:spcBef>
-                          <a:spcPts val="0"/>
-                        </a:spcBef>
-                        <a:spcAft>
-                          <a:spcPts val="0"/>
-                        </a:spcAft>
-                        <a:buClrTx/>
-                        <a:buSzTx/>
-                        <a:buFontTx/>
-                        <a:buNone/>
-                        <a:tabLst/>
-                        <a:defRPr/>
-                      </a:pPr>
-                      <a:r>
-                        <a:rPr lang="en-US" dirty="0"/>
-                        <a:t>Python</a:t>
-                      </a:r>
-                      <a:endParaRPr lang="en-NL" dirty="0"/>
-                    </a:p>
-                  </a:txBody>
-                  <a:tcPr anchor="ctr"/>
-                </a:tc>
-                <a:tc>
-                  <a:txBody>
-                    <a:bodyPr/>
-                    <a:lstStyle/>
-                    <a:p>
-                      <a:pPr marL="0" marR="0" lvl="0" indent="0" algn="ctr" defTabSz="914400" rtl="0" eaLnBrk="1" fontAlgn="auto" latinLnBrk="0" hangingPunct="1">
-                        <a:lnSpc>
-                          <a:spcPct val="100000"/>
-                        </a:lnSpc>
-                        <a:spcBef>
-                          <a:spcPts val="0"/>
-                        </a:spcBef>
-                        <a:spcAft>
-                          <a:spcPts val="0"/>
-                        </a:spcAft>
-                        <a:buClrTx/>
-                        <a:buSzTx/>
-                        <a:buFontTx/>
-                        <a:buNone/>
-                        <a:tabLst/>
-                        <a:defRPr/>
-                      </a:pPr>
-                      <a:r>
-                        <a:rPr lang="en-US" dirty="0"/>
-                        <a:t>9.0</a:t>
-                      </a:r>
-                      <a:endParaRPr lang="en-NL" dirty="0"/>
-                    </a:p>
-                  </a:txBody>
-                  <a:tcPr anchor="ctr"/>
-                </a:tc>
-                <a:extLst>
-                  <a:ext uri="{0D108BD9-81ED-4DB2-BD59-A6C34878D82A}">
-                    <a16:rowId xmlns:a16="http://schemas.microsoft.com/office/drawing/2014/main" val="3432716353"/>
-                  </a:ext>
-                </a:extLst>
-              </a:tr>
-              <a:tr h="609071">
-                <a:tc vMerge="1">
-                  <a:txBody>
-                    <a:bodyPr/>
-                    <a:lstStyle/>
-                    <a:p>
-                      <a:endParaRPr lang="en-NL" dirty="0"/>
-                    </a:p>
-                  </a:txBody>
-                  <a:tcPr/>
-                </a:tc>
-                <a:tc>
-                  <a:txBody>
-                    <a:bodyPr/>
-                    <a:lstStyle/>
-                    <a:p>
-                      <a:pPr algn="ctr"/>
-                      <a:r>
-                        <a:rPr lang="en-US" dirty="0"/>
-                        <a:t>2</a:t>
                       </a:r>
                       <a:endParaRPr lang="en-NL" dirty="0"/>
                     </a:p>
@@ -27058,6 +26944,138 @@
                       </a:pPr>
                       <a:r>
                         <a:rPr lang="en-US" dirty="0"/>
+                        <a:t>Ingrid</a:t>
+                      </a:r>
+                      <a:endParaRPr lang="en-NL" dirty="0"/>
+                    </a:p>
+                  </a:txBody>
+                  <a:tcPr anchor="ctr"/>
+                </a:tc>
+                <a:tc>
+                  <a:txBody>
+                    <a:bodyPr/>
+                    <a:lstStyle/>
+                    <a:p>
+                      <a:pPr marL="0" marR="0" lvl="0" indent="0" algn="ctr" defTabSz="914400" rtl="0" eaLnBrk="1" fontAlgn="auto" latinLnBrk="0" hangingPunct="1">
+                        <a:lnSpc>
+                          <a:spcPct val="100000"/>
+                        </a:lnSpc>
+                        <a:spcBef>
+                          <a:spcPts val="0"/>
+                        </a:spcBef>
+                        <a:spcAft>
+                          <a:spcPts val="0"/>
+                        </a:spcAft>
+                        <a:buClrTx/>
+                        <a:buSzTx/>
+                        <a:buFontTx/>
+                        <a:buNone/>
+                        <a:tabLst/>
+                        <a:defRPr/>
+                      </a:pPr>
+                      <a:r>
+                        <a:rPr lang="en-US" dirty="0"/>
+                        <a:t>Python</a:t>
+                      </a:r>
+                      <a:endParaRPr lang="en-NL" dirty="0"/>
+                    </a:p>
+                  </a:txBody>
+                  <a:tcPr anchor="ctr"/>
+                </a:tc>
+                <a:tc>
+                  <a:txBody>
+                    <a:bodyPr/>
+                    <a:lstStyle/>
+                    <a:p>
+                      <a:pPr marL="0" marR="0" lvl="0" indent="0" algn="ctr" defTabSz="914400" rtl="0" eaLnBrk="1" fontAlgn="auto" latinLnBrk="0" hangingPunct="1">
+                        <a:lnSpc>
+                          <a:spcPct val="100000"/>
+                        </a:lnSpc>
+                        <a:spcBef>
+                          <a:spcPts val="0"/>
+                        </a:spcBef>
+                        <a:spcAft>
+                          <a:spcPts val="0"/>
+                        </a:spcAft>
+                        <a:buClrTx/>
+                        <a:buSzTx/>
+                        <a:buFontTx/>
+                        <a:buNone/>
+                        <a:tabLst/>
+                        <a:defRPr/>
+                      </a:pPr>
+                      <a:r>
+                        <a:rPr lang="en-US" dirty="0"/>
+                        <a:t>9.0</a:t>
+                      </a:r>
+                      <a:endParaRPr lang="en-NL" dirty="0"/>
+                    </a:p>
+                  </a:txBody>
+                  <a:tcPr anchor="ctr"/>
+                </a:tc>
+                <a:extLst>
+                  <a:ext uri="{0D108BD9-81ED-4DB2-BD59-A6C34878D82A}">
+                    <a16:rowId xmlns:a16="http://schemas.microsoft.com/office/drawing/2014/main" val="3432716353"/>
+                  </a:ext>
+                </a:extLst>
+              </a:tr>
+              <a:tr h="609071">
+                <a:tc vMerge="1">
+                  <a:txBody>
+                    <a:bodyPr/>
+                    <a:lstStyle/>
+                    <a:p>
+                      <a:endParaRPr lang="en-NL" dirty="0"/>
+                    </a:p>
+                  </a:txBody>
+                  <a:tcPr/>
+                </a:tc>
+                <a:tc>
+                  <a:txBody>
+                    <a:bodyPr/>
+                    <a:lstStyle/>
+                    <a:p>
+                      <a:pPr algn="ctr"/>
+                      <a:r>
+                        <a:rPr lang="en-US" dirty="0"/>
+                        <a:t>2</a:t>
+                      </a:r>
+                      <a:endParaRPr lang="en-NL" dirty="0"/>
+                    </a:p>
+                  </a:txBody>
+                  <a:tcPr anchor="ctr">
+                    <a:solidFill>
+                      <a:schemeClr val="accent4">
+                        <a:lumMod val="20000"/>
+                        <a:lumOff val="80000"/>
+                      </a:schemeClr>
+                    </a:solidFill>
+                  </a:tcPr>
+                </a:tc>
+                <a:tc>
+                  <a:txBody>
+                    <a:bodyPr/>
+                    <a:lstStyle/>
+                    <a:p>
+                      <a:pPr marL="0" marR="0" lvl="0" indent="0" algn="ctr" defTabSz="914400" rtl="0" eaLnBrk="1" fontAlgn="auto" latinLnBrk="0" hangingPunct="1">
+                        <a:lnSpc>
+                          <a:spcPct val="100000"/>
+                        </a:lnSpc>
+                        <a:spcBef>
+                          <a:spcPts val="0"/>
+                        </a:spcBef>
+                        <a:spcAft>
+                          <a:spcPts val="0"/>
+                        </a:spcAft>
+                        <a:buClrTx/>
+                        <a:buSzTx/>
+                        <a:buFontTx/>
+                        <a:buNone/>
+                        <a:tabLst/>
+                        <a:defRPr/>
+                      </a:pPr>
+                      <a:r>
+                        <a:rPr lang="en-US" dirty="0"/>
                         <a:t>Sara</a:t>
                       </a:r>
                       <a:endParaRPr lang="en-NL" dirty="0"/>
@@ -27160,8 +27178,8 @@
                   <a:tcPr anchor="ctr">
                     <a:solidFill>
                       <a:schemeClr val="accent4">
-                        <a:lumMod val="60000"/>
-                        <a:lumOff val="40000"/>
+                        <a:lumMod val="40000"/>
+                        <a:lumOff val="60000"/>
                       </a:schemeClr>
                     </a:solidFill>
                   </a:tcPr>
@@ -27295,8 +27313,8 @@
                     </a:lnB>
                     <a:solidFill>
                       <a:schemeClr val="accent4">
-                        <a:lumMod val="40000"/>
-                        <a:lumOff val="60000"/>
+                        <a:lumMod val="20000"/>
+                        <a:lumOff val="80000"/>
                       </a:schemeClr>
                     </a:solidFill>
                   </a:tcPr>
@@ -27495,8 +27513,8 @@
                     </a:lnR>
                     <a:solidFill>
                       <a:schemeClr val="accent4">
-                        <a:lumMod val="60000"/>
-                        <a:lumOff val="40000"/>
+                        <a:lumMod val="40000"/>
+                        <a:lumOff val="60000"/>
                       </a:schemeClr>
                     </a:solidFill>
                   </a:tcPr>
@@ -27530,8 +27548,8 @@
                     </a:lnR>
                     <a:solidFill>
                       <a:schemeClr val="accent4">
-                        <a:lumMod val="60000"/>
-                        <a:lumOff val="40000"/>
+                        <a:lumMod val="40000"/>
+                        <a:lumOff val="60000"/>
                       </a:schemeClr>
                     </a:solidFill>
                   </a:tcPr>
@@ -27562,8 +27580,8 @@
                     </a:lnL>
                     <a:solidFill>
                       <a:schemeClr val="accent4">
-                        <a:lumMod val="60000"/>
-                        <a:lumOff val="40000"/>
+                        <a:lumMod val="40000"/>
+                        <a:lumOff val="60000"/>
                       </a:schemeClr>
                     </a:solidFill>
                   </a:tcPr>

</xml_diff>